<commit_message>
agregamos conclusion al informe
</commit_message>
<xml_diff>
--- a/main/Informe.pptx
+++ b/main/Informe.pptx
@@ -12,6 +12,7 @@
     <p:sldId id="297" r:id="rId9"/>
     <p:sldId id="298" r:id="rId10"/>
     <p:sldId id="299" r:id="rId11"/>
+    <p:sldId id="300" r:id="rId12"/>
   </p:sldIdLst>
   <p:sldSz cx="12192000" cy="6858000"/>
   <p:notesSz cx="6858000" cy="9144000"/>
@@ -6720,6 +6721,695 @@
     <p:extLst>
       <p:ext uri="{BB962C8B-B14F-4D97-AF65-F5344CB8AC3E}">
         <p14:creationId xmlns:p14="http://schemas.microsoft.com/office/powerpoint/2010/main" val="3897214526"/>
+      </p:ext>
+    </p:extLst>
+  </p:cSld>
+  <p:clrMapOvr>
+    <a:masterClrMapping/>
+  </p:clrMapOvr>
+</p:sld>
+</file>
+
+<file path=ppt/slides/slide8.xml><?xml version="1.0" encoding="utf-8"?>
+<p:sld xmlns:a="http://schemas.openxmlformats.org/drawingml/2006/main" xmlns:r="http://schemas.openxmlformats.org/officeDocument/2006/relationships" xmlns:p="http://schemas.openxmlformats.org/presentationml/2006/main">
+  <p:cSld>
+    <p:spTree>
+      <p:nvGrpSpPr>
+        <p:cNvPr id="1" name=""/>
+        <p:cNvGrpSpPr/>
+        <p:nvPr/>
+      </p:nvGrpSpPr>
+      <p:grpSpPr>
+        <a:xfrm>
+          <a:off x="0" y="0"/>
+          <a:ext cx="0" cy="0"/>
+          <a:chOff x="0" y="0"/>
+          <a:chExt cx="0" cy="0"/>
+        </a:xfrm>
+      </p:grpSpPr>
+      <p:sp>
+        <p:nvSpPr>
+          <p:cNvPr id="2" name="Title 1">
+            <a:extLst>
+              <a:ext uri="{FF2B5EF4-FFF2-40B4-BE49-F238E27FC236}">
+                <a16:creationId xmlns:a16="http://schemas.microsoft.com/office/drawing/2014/main" id="{229589AF-2C72-4964-9F1C-0F39C391C1BF}"/>
+              </a:ext>
+            </a:extLst>
+          </p:cNvPr>
+          <p:cNvSpPr>
+            <a:spLocks noGrp="1"/>
+          </p:cNvSpPr>
+          <p:nvPr>
+            <p:ph type="title"/>
+          </p:nvPr>
+        </p:nvSpPr>
+        <p:spPr/>
+        <p:txBody>
+          <a:bodyPr/>
+          <a:lstStyle/>
+          <a:p>
+            <a:r>
+              <a:rPr lang="en-US" dirty="0" err="1"/>
+              <a:t>Conclusión</a:t>
+            </a:r>
+            <a:endParaRPr lang="en-US" dirty="0"/>
+          </a:p>
+        </p:txBody>
+      </p:sp>
+      <p:sp>
+        <p:nvSpPr>
+          <p:cNvPr id="3" name="Content Placeholder 2">
+            <a:extLst>
+              <a:ext uri="{FF2B5EF4-FFF2-40B4-BE49-F238E27FC236}">
+                <a16:creationId xmlns:a16="http://schemas.microsoft.com/office/drawing/2014/main" id="{31DACDC1-58D1-431D-8488-AF67289658E1}"/>
+              </a:ext>
+            </a:extLst>
+          </p:cNvPr>
+          <p:cNvSpPr>
+            <a:spLocks noGrp="1"/>
+          </p:cNvSpPr>
+          <p:nvPr>
+            <p:ph idx="1"/>
+          </p:nvPr>
+        </p:nvSpPr>
+        <p:spPr>
+          <a:xfrm>
+            <a:off x="1066800" y="2103119"/>
+            <a:ext cx="10058400" cy="4010809"/>
+          </a:xfrm>
+        </p:spPr>
+        <p:txBody>
+          <a:bodyPr>
+            <a:noAutofit/>
+          </a:bodyPr>
+          <a:lstStyle/>
+          <a:p>
+            <a:r>
+              <a:rPr lang="en-US" sz="1700" dirty="0" err="1"/>
+              <a:t>Vemos</a:t>
+            </a:r>
+            <a:r>
+              <a:rPr lang="en-US" sz="1700" dirty="0"/>
+              <a:t> que </a:t>
+            </a:r>
+            <a:r>
+              <a:rPr lang="en-US" sz="1700" dirty="0" err="1"/>
+              <a:t>en</a:t>
+            </a:r>
+            <a:r>
+              <a:rPr lang="en-US" sz="1700" dirty="0"/>
+              <a:t> </a:t>
+            </a:r>
+            <a:r>
+              <a:rPr lang="en-US" sz="1700" dirty="0" err="1"/>
+              <a:t>éste</a:t>
+            </a:r>
+            <a:r>
+              <a:rPr lang="en-US" sz="1700" dirty="0"/>
+              <a:t> </a:t>
+            </a:r>
+            <a:r>
+              <a:rPr lang="en-US" sz="1700" dirty="0" err="1"/>
+              <a:t>caso</a:t>
+            </a:r>
+            <a:r>
+              <a:rPr lang="en-US" sz="1700" dirty="0"/>
+              <a:t> particular, greedy </a:t>
+            </a:r>
+            <a:r>
+              <a:rPr lang="en-US" sz="1700" dirty="0" err="1"/>
+              <a:t>siempre</a:t>
+            </a:r>
+            <a:r>
+              <a:rPr lang="en-US" sz="1700" dirty="0"/>
+              <a:t> </a:t>
+            </a:r>
+            <a:r>
+              <a:rPr lang="en-US" sz="1700" dirty="0" err="1"/>
+              <a:t>encuentra</a:t>
+            </a:r>
+            <a:r>
+              <a:rPr lang="en-US" sz="1700" dirty="0"/>
+              <a:t> la </a:t>
+            </a:r>
+            <a:r>
+              <a:rPr lang="en-US" sz="1700" dirty="0" err="1"/>
+              <a:t>mejor</a:t>
+            </a:r>
+            <a:r>
+              <a:rPr lang="en-US" sz="1700" dirty="0"/>
+              <a:t> </a:t>
+            </a:r>
+            <a:r>
+              <a:rPr lang="en-US" sz="1700" dirty="0" err="1"/>
+              <a:t>solución</a:t>
+            </a:r>
+            <a:r>
+              <a:rPr lang="en-US" sz="1700" dirty="0"/>
+              <a:t> y backtracking </a:t>
+            </a:r>
+            <a:r>
+              <a:rPr lang="en-US" sz="1700" dirty="0" err="1"/>
+              <a:t>también</a:t>
+            </a:r>
+            <a:r>
+              <a:rPr lang="en-US" sz="1700" dirty="0"/>
+              <a:t>, solo que </a:t>
+            </a:r>
+            <a:r>
+              <a:rPr lang="en-US" sz="1700" dirty="0" err="1"/>
+              <a:t>el</a:t>
+            </a:r>
+            <a:r>
+              <a:rPr lang="en-US" sz="1700" dirty="0"/>
+              <a:t> </a:t>
+            </a:r>
+            <a:r>
+              <a:rPr lang="en-US" sz="1700" dirty="0" err="1"/>
+              <a:t>costo</a:t>
+            </a:r>
+            <a:r>
+              <a:rPr lang="en-US" sz="1700" dirty="0"/>
+              <a:t> </a:t>
+            </a:r>
+            <a:r>
+              <a:rPr lang="en-US" sz="1700" dirty="0" err="1"/>
+              <a:t>en</a:t>
+            </a:r>
+            <a:r>
+              <a:rPr lang="en-US" sz="1700" dirty="0"/>
+              <a:t> </a:t>
+            </a:r>
+            <a:r>
+              <a:rPr lang="en-US" sz="1700" dirty="0" err="1"/>
+              <a:t>cantidad</a:t>
+            </a:r>
+            <a:r>
+              <a:rPr lang="en-US" sz="1700" dirty="0"/>
+              <a:t> de pasos es </a:t>
+            </a:r>
+            <a:r>
+              <a:rPr lang="en-US" sz="1700" dirty="0" err="1"/>
+              <a:t>abismal</a:t>
+            </a:r>
+            <a:r>
+              <a:rPr lang="en-US" sz="1700" dirty="0"/>
+              <a:t>, </a:t>
+            </a:r>
+            <a:r>
+              <a:rPr lang="en-US" sz="1700" dirty="0" err="1"/>
+              <a:t>más</a:t>
+            </a:r>
+            <a:r>
+              <a:rPr lang="en-US" sz="1700" dirty="0"/>
+              <a:t> notable la </a:t>
+            </a:r>
+            <a:r>
+              <a:rPr lang="en-US" sz="1700" dirty="0" err="1"/>
+              <a:t>diferencia</a:t>
+            </a:r>
+            <a:r>
+              <a:rPr lang="en-US" sz="1700" dirty="0"/>
+              <a:t> </a:t>
+            </a:r>
+            <a:r>
+              <a:rPr lang="en-US" sz="1700" dirty="0" err="1"/>
+              <a:t>en</a:t>
+            </a:r>
+            <a:r>
+              <a:rPr lang="en-US" sz="1700" dirty="0"/>
+              <a:t> </a:t>
+            </a:r>
+            <a:r>
+              <a:rPr lang="en-US" sz="1700" dirty="0" err="1"/>
+              <a:t>el</a:t>
+            </a:r>
+            <a:r>
+              <a:rPr lang="en-US" sz="1700" dirty="0"/>
+              <a:t> dataset3.</a:t>
+            </a:r>
+          </a:p>
+          <a:p>
+            <a:r>
+              <a:rPr lang="en-US" sz="1700" dirty="0" err="1"/>
+              <a:t>Eso</a:t>
+            </a:r>
+            <a:r>
+              <a:rPr lang="en-US" sz="1700" dirty="0"/>
+              <a:t> sin </a:t>
+            </a:r>
+            <a:r>
+              <a:rPr lang="en-US" sz="1700" dirty="0" err="1"/>
+              <a:t>considerar</a:t>
+            </a:r>
+            <a:r>
+              <a:rPr lang="en-US" sz="1700" dirty="0"/>
+              <a:t> de que la </a:t>
+            </a:r>
+            <a:r>
+              <a:rPr lang="en-US" sz="1700" dirty="0" err="1"/>
+              <a:t>manera</a:t>
+            </a:r>
+            <a:r>
+              <a:rPr lang="en-US" sz="1700" dirty="0"/>
+              <a:t> </a:t>
+            </a:r>
+            <a:r>
+              <a:rPr lang="en-US" sz="1700" dirty="0" err="1"/>
+              <a:t>en</a:t>
+            </a:r>
+            <a:r>
+              <a:rPr lang="en-US" sz="1700" dirty="0"/>
+              <a:t> la que </a:t>
+            </a:r>
+            <a:r>
+              <a:rPr lang="en-US" sz="1700" dirty="0" err="1"/>
+              <a:t>está</a:t>
+            </a:r>
+            <a:r>
+              <a:rPr lang="en-US" sz="1700" dirty="0"/>
+              <a:t> </a:t>
+            </a:r>
+            <a:r>
+              <a:rPr lang="en-US" sz="1700" dirty="0" err="1"/>
+              <a:t>planteada</a:t>
+            </a:r>
+            <a:r>
+              <a:rPr lang="en-US" sz="1700" dirty="0"/>
+              <a:t> </a:t>
+            </a:r>
+            <a:r>
+              <a:rPr lang="en-US" sz="1700" dirty="0" err="1"/>
+              <a:t>el</a:t>
+            </a:r>
+            <a:r>
+              <a:rPr lang="en-US" sz="1700" dirty="0"/>
+              <a:t> backtracking no </a:t>
+            </a:r>
+            <a:r>
+              <a:rPr lang="en-US" sz="1700" dirty="0" err="1"/>
+              <a:t>duplica</a:t>
+            </a:r>
+            <a:r>
+              <a:rPr lang="en-US" sz="1700" dirty="0"/>
+              <a:t> </a:t>
+            </a:r>
+            <a:r>
+              <a:rPr lang="en-US" sz="1700" dirty="0" err="1"/>
+              <a:t>estados</a:t>
+            </a:r>
+            <a:r>
+              <a:rPr lang="en-US" sz="1700" dirty="0"/>
+              <a:t> y </a:t>
+            </a:r>
+            <a:r>
+              <a:rPr lang="en-US" sz="1700" dirty="0" err="1"/>
+              <a:t>tiene</a:t>
+            </a:r>
+            <a:r>
+              <a:rPr lang="en-US" sz="1700" dirty="0"/>
+              <a:t> </a:t>
+            </a:r>
+            <a:r>
+              <a:rPr lang="en-US" sz="1700" dirty="0" err="1"/>
+              <a:t>varias</a:t>
+            </a:r>
+            <a:r>
+              <a:rPr lang="en-US" sz="1700" dirty="0"/>
+              <a:t> </a:t>
+            </a:r>
+            <a:r>
+              <a:rPr lang="en-US" sz="1700" dirty="0" err="1"/>
+              <a:t>restricciones</a:t>
+            </a:r>
+            <a:r>
+              <a:rPr lang="en-US" sz="1700" dirty="0"/>
+              <a:t> para </a:t>
+            </a:r>
+            <a:r>
+              <a:rPr lang="en-US" sz="1700" dirty="0" err="1"/>
+              <a:t>recortar</a:t>
+            </a:r>
+            <a:r>
+              <a:rPr lang="en-US" sz="1700" dirty="0"/>
+              <a:t> la </a:t>
+            </a:r>
+            <a:r>
+              <a:rPr lang="en-US" sz="1700" dirty="0" err="1"/>
+              <a:t>generación</a:t>
+            </a:r>
+            <a:r>
+              <a:rPr lang="en-US" sz="1700" dirty="0"/>
+              <a:t> de </a:t>
+            </a:r>
+            <a:r>
+              <a:rPr lang="en-US" sz="1700" dirty="0" err="1"/>
+              <a:t>nuevos</a:t>
+            </a:r>
+            <a:r>
+              <a:rPr lang="en-US" sz="1700" dirty="0"/>
+              <a:t> </a:t>
+            </a:r>
+            <a:r>
+              <a:rPr lang="en-US" sz="1700" dirty="0" err="1"/>
+              <a:t>estados</a:t>
+            </a:r>
+            <a:r>
+              <a:rPr lang="en-US" sz="1700" dirty="0"/>
+              <a:t> a la </a:t>
+            </a:r>
+            <a:r>
+              <a:rPr lang="en-US" sz="1700" dirty="0" err="1"/>
+              <a:t>menor</a:t>
+            </a:r>
+            <a:r>
+              <a:rPr lang="en-US" sz="1700" dirty="0"/>
+              <a:t> </a:t>
+            </a:r>
+            <a:r>
+              <a:rPr lang="en-US" sz="1700" dirty="0" err="1"/>
+              <a:t>cantidad</a:t>
+            </a:r>
+            <a:r>
+              <a:rPr lang="en-US" sz="1700" dirty="0"/>
+              <a:t> </a:t>
+            </a:r>
+            <a:r>
+              <a:rPr lang="en-US" sz="1700" dirty="0" err="1"/>
+              <a:t>posible</a:t>
+            </a:r>
+            <a:r>
+              <a:rPr lang="en-US" sz="1700" dirty="0"/>
+              <a:t>.</a:t>
+            </a:r>
+          </a:p>
+          <a:p>
+            <a:r>
+              <a:rPr lang="en-US" sz="1700" dirty="0"/>
+              <a:t>Backtracking </a:t>
+            </a:r>
+            <a:r>
+              <a:rPr lang="en-US" sz="1700" dirty="0" err="1"/>
+              <a:t>debería</a:t>
+            </a:r>
+            <a:r>
+              <a:rPr lang="en-US" sz="1700" dirty="0"/>
+              <a:t> ser </a:t>
+            </a:r>
+            <a:r>
+              <a:rPr lang="en-US" sz="1700" dirty="0" err="1"/>
+              <a:t>aplicado</a:t>
+            </a:r>
+            <a:r>
+              <a:rPr lang="en-US" sz="1700" dirty="0"/>
+              <a:t> </a:t>
+            </a:r>
+            <a:r>
+              <a:rPr lang="en-US" sz="1700" dirty="0" err="1"/>
+              <a:t>en</a:t>
+            </a:r>
+            <a:r>
+              <a:rPr lang="en-US" sz="1700" dirty="0"/>
+              <a:t> </a:t>
+            </a:r>
+            <a:r>
+              <a:rPr lang="en-US" sz="1700" dirty="0" err="1"/>
+              <a:t>situaciones</a:t>
+            </a:r>
+            <a:r>
+              <a:rPr lang="en-US" sz="1700" dirty="0"/>
+              <a:t> </a:t>
+            </a:r>
+            <a:r>
+              <a:rPr lang="en-US" sz="1700" dirty="0" err="1"/>
+              <a:t>reales</a:t>
+            </a:r>
+            <a:r>
+              <a:rPr lang="en-US" sz="1700" dirty="0"/>
+              <a:t> </a:t>
+            </a:r>
+            <a:r>
+              <a:rPr lang="en-US" sz="1700" dirty="0" err="1"/>
+              <a:t>en</a:t>
+            </a:r>
+            <a:r>
+              <a:rPr lang="en-US" sz="1700" dirty="0"/>
+              <a:t> </a:t>
+            </a:r>
+            <a:r>
+              <a:rPr lang="en-US" sz="1700" dirty="0" err="1"/>
+              <a:t>caso</a:t>
+            </a:r>
+            <a:r>
+              <a:rPr lang="en-US" sz="1700" dirty="0"/>
+              <a:t> de que con greedy no </a:t>
+            </a:r>
+            <a:r>
+              <a:rPr lang="en-US" sz="1700" dirty="0" err="1"/>
+              <a:t>podamos</a:t>
+            </a:r>
+            <a:r>
+              <a:rPr lang="en-US" sz="1700" dirty="0"/>
+              <a:t> </a:t>
+            </a:r>
+            <a:r>
+              <a:rPr lang="en-US" sz="1700" dirty="0" err="1"/>
+              <a:t>encontrar</a:t>
+            </a:r>
+            <a:r>
+              <a:rPr lang="en-US" sz="1700" dirty="0"/>
+              <a:t> la </a:t>
+            </a:r>
+            <a:r>
+              <a:rPr lang="en-US" sz="1700" dirty="0" err="1"/>
+              <a:t>mejor</a:t>
+            </a:r>
+            <a:r>
+              <a:rPr lang="en-US" sz="1700" dirty="0"/>
+              <a:t> </a:t>
+            </a:r>
+            <a:r>
+              <a:rPr lang="en-US" sz="1700" dirty="0" err="1"/>
+              <a:t>solución</a:t>
+            </a:r>
+            <a:r>
+              <a:rPr lang="en-US" sz="1700" dirty="0"/>
+              <a:t> y </a:t>
+            </a:r>
+            <a:r>
+              <a:rPr lang="en-US" sz="1700" dirty="0" err="1"/>
+              <a:t>necesitemos</a:t>
+            </a:r>
+            <a:r>
+              <a:rPr lang="en-US" sz="1700" dirty="0"/>
+              <a:t> </a:t>
+            </a:r>
+            <a:r>
+              <a:rPr lang="en-US" sz="1700" dirty="0" err="1"/>
+              <a:t>encontrarla</a:t>
+            </a:r>
+            <a:r>
+              <a:rPr lang="en-US" sz="1700" dirty="0"/>
+              <a:t>.</a:t>
+            </a:r>
+          </a:p>
+          <a:p>
+            <a:r>
+              <a:rPr lang="en-US" sz="1700" dirty="0"/>
+              <a:t>Tener </a:t>
+            </a:r>
+            <a:r>
+              <a:rPr lang="en-US" sz="1700" dirty="0" err="1"/>
+              <a:t>muy</a:t>
+            </a:r>
+            <a:r>
+              <a:rPr lang="en-US" sz="1700" dirty="0"/>
+              <a:t> </a:t>
+            </a:r>
+            <a:r>
+              <a:rPr lang="en-US" sz="1700" dirty="0" err="1"/>
+              <a:t>en</a:t>
+            </a:r>
+            <a:r>
+              <a:rPr lang="en-US" sz="1700" dirty="0"/>
+              <a:t> </a:t>
+            </a:r>
+            <a:r>
+              <a:rPr lang="en-US" sz="1700" dirty="0" err="1"/>
+              <a:t>cuenta</a:t>
+            </a:r>
+            <a:r>
+              <a:rPr lang="en-US" sz="1700" dirty="0"/>
+              <a:t> </a:t>
+            </a:r>
+            <a:r>
+              <a:rPr lang="en-US" sz="1700" dirty="0" err="1"/>
+              <a:t>el</a:t>
+            </a:r>
+            <a:r>
+              <a:rPr lang="en-US" sz="1700" dirty="0"/>
+              <a:t> </a:t>
+            </a:r>
+            <a:r>
+              <a:rPr lang="en-US" sz="1700" dirty="0" err="1"/>
+              <a:t>tamaño</a:t>
+            </a:r>
+            <a:r>
+              <a:rPr lang="en-US" sz="1700" dirty="0"/>
+              <a:t> de la entrada </a:t>
+            </a:r>
+            <a:r>
+              <a:rPr lang="en-US" sz="1700" dirty="0" err="1"/>
+              <a:t>en</a:t>
+            </a:r>
+            <a:r>
+              <a:rPr lang="en-US" sz="1700" dirty="0"/>
+              <a:t> </a:t>
+            </a:r>
+            <a:r>
+              <a:rPr lang="en-US" sz="1700" dirty="0" err="1"/>
+              <a:t>el</a:t>
+            </a:r>
+            <a:r>
+              <a:rPr lang="en-US" sz="1700" dirty="0"/>
+              <a:t> backtracking, una </a:t>
+            </a:r>
+            <a:r>
+              <a:rPr lang="en-US" sz="1700" dirty="0" err="1"/>
+              <a:t>tarea</a:t>
+            </a:r>
+            <a:r>
+              <a:rPr lang="en-US" sz="1700" dirty="0"/>
+              <a:t> con una entrada </a:t>
+            </a:r>
+            <a:r>
+              <a:rPr lang="en-US" sz="1700" dirty="0" err="1"/>
+              <a:t>muy</a:t>
+            </a:r>
+            <a:r>
+              <a:rPr lang="en-US" sz="1700" dirty="0"/>
+              <a:t> </a:t>
+            </a:r>
+            <a:r>
+              <a:rPr lang="en-US" sz="1700" dirty="0" err="1"/>
+              <a:t>grande</a:t>
+            </a:r>
+            <a:r>
+              <a:rPr lang="en-US" sz="1700" dirty="0"/>
+              <a:t> </a:t>
+            </a:r>
+            <a:r>
+              <a:rPr lang="en-US" sz="1700" dirty="0" err="1"/>
+              <a:t>podría</a:t>
+            </a:r>
+            <a:r>
+              <a:rPr lang="en-US" sz="1700" dirty="0"/>
+              <a:t> </a:t>
+            </a:r>
+            <a:r>
+              <a:rPr lang="en-US" sz="1700" dirty="0" err="1"/>
+              <a:t>tardar</a:t>
+            </a:r>
+            <a:r>
+              <a:rPr lang="en-US" sz="1700" dirty="0"/>
+              <a:t> horas, días, etc.</a:t>
+            </a:r>
+          </a:p>
+          <a:p>
+            <a:r>
+              <a:rPr lang="en-US" sz="1700" dirty="0"/>
+              <a:t>Greedy </a:t>
+            </a:r>
+            <a:r>
+              <a:rPr lang="en-US" sz="1700" dirty="0" err="1"/>
+              <a:t>puede</a:t>
+            </a:r>
+            <a:r>
+              <a:rPr lang="en-US" sz="1700" dirty="0"/>
+              <a:t> </a:t>
+            </a:r>
+            <a:r>
+              <a:rPr lang="en-US" sz="1700" dirty="0" err="1"/>
+              <a:t>encontrar</a:t>
+            </a:r>
+            <a:r>
+              <a:rPr lang="en-US" sz="1700" dirty="0"/>
+              <a:t> la </a:t>
+            </a:r>
+            <a:r>
+              <a:rPr lang="en-US" sz="1700" dirty="0" err="1"/>
+              <a:t>mejor</a:t>
+            </a:r>
+            <a:r>
+              <a:rPr lang="en-US" sz="1700" dirty="0"/>
+              <a:t> </a:t>
+            </a:r>
+            <a:r>
+              <a:rPr lang="en-US" sz="1700" dirty="0" err="1"/>
+              <a:t>solución</a:t>
+            </a:r>
+            <a:r>
+              <a:rPr lang="en-US" sz="1700" dirty="0"/>
+              <a:t> </a:t>
+            </a:r>
+            <a:r>
+              <a:rPr lang="en-US" sz="1700" dirty="0" err="1"/>
+              <a:t>en</a:t>
+            </a:r>
+            <a:r>
+              <a:rPr lang="en-US" sz="1700" dirty="0"/>
+              <a:t> </a:t>
+            </a:r>
+            <a:r>
+              <a:rPr lang="en-US" sz="1700" dirty="0" err="1"/>
+              <a:t>algunos</a:t>
+            </a:r>
+            <a:r>
+              <a:rPr lang="en-US" sz="1700" dirty="0"/>
+              <a:t> </a:t>
+            </a:r>
+            <a:r>
+              <a:rPr lang="en-US" sz="1700" dirty="0" err="1"/>
+              <a:t>problemas</a:t>
+            </a:r>
+            <a:r>
+              <a:rPr lang="en-US" sz="1700" dirty="0"/>
+              <a:t>, Backtracking </a:t>
+            </a:r>
+            <a:r>
+              <a:rPr lang="en-US" sz="1700" dirty="0" err="1"/>
+              <a:t>en</a:t>
+            </a:r>
+            <a:r>
+              <a:rPr lang="en-US" sz="1700" dirty="0"/>
+              <a:t> </a:t>
+            </a:r>
+            <a:r>
+              <a:rPr lang="en-US" sz="1700" dirty="0" err="1"/>
+              <a:t>todos</a:t>
+            </a:r>
+            <a:r>
+              <a:rPr lang="en-US" sz="1700" dirty="0"/>
+              <a:t>, </a:t>
+            </a:r>
+            <a:r>
+              <a:rPr lang="en-US" sz="1700" dirty="0" err="1"/>
+              <a:t>pero</a:t>
+            </a:r>
+            <a:r>
+              <a:rPr lang="en-US" sz="1700" dirty="0"/>
+              <a:t> es CARO.</a:t>
+            </a:r>
+          </a:p>
+          <a:p>
+            <a:endParaRPr lang="en-US" sz="1700" dirty="0"/>
+          </a:p>
+        </p:txBody>
+      </p:sp>
+    </p:spTree>
+    <p:extLst>
+      <p:ext uri="{BB962C8B-B14F-4D97-AF65-F5344CB8AC3E}">
+        <p14:creationId xmlns:p14="http://schemas.microsoft.com/office/powerpoint/2010/main" val="3770785554"/>
       </p:ext>
     </p:extLst>
   </p:cSld>

</xml_diff>